<commit_message>
added p-values, warnings and colors to UI
</commit_message>
<xml_diff>
--- a/bd_template_homemade.pptx
+++ b/bd_template_homemade.pptx
@@ -209,7 +209,7 @@
           <a:p>
             <a:fld id="{42712DD4-FBD6-4D50-8BFA-3BD02E614182}" type="datetimeFigureOut">
               <a:rPr lang="en-US" smtClean="0"/>
-              <a:t>4/26/2021</a:t>
+              <a:t>5/21/2021</a:t>
             </a:fld>
             <a:endParaRPr lang="en-US"/>
           </a:p>
@@ -645,7 +645,7 @@
           <a:p>
             <a:fld id="{969106CC-F607-DD49-B981-653BDF28D768}" type="datetimeFigureOut">
               <a:rPr lang="en-US" smtClean="0"/>
-              <a:t>4/26/2021</a:t>
+              <a:t>5/21/2021</a:t>
             </a:fld>
             <a:endParaRPr lang="en-US"/>
           </a:p>
@@ -853,7 +853,7 @@
           <a:p>
             <a:fld id="{969106CC-F607-DD49-B981-653BDF28D768}" type="datetimeFigureOut">
               <a:rPr lang="en-US" smtClean="0"/>
-              <a:t>4/26/2021</a:t>
+              <a:t>5/21/2021</a:t>
             </a:fld>
             <a:endParaRPr lang="en-US"/>
           </a:p>
@@ -1621,7 +1621,7 @@
           <a:p>
             <a:fld id="{969106CC-F607-DD49-B981-653BDF28D768}" type="datetimeFigureOut">
               <a:rPr lang="en-US" smtClean="0"/>
-              <a:t>4/26/2021</a:t>
+              <a:t>5/21/2021</a:t>
             </a:fld>
             <a:endParaRPr lang="en-US"/>
           </a:p>
@@ -2041,7 +2041,7 @@
           <a:p>
             <a:fld id="{969106CC-F607-DD49-B981-653BDF28D768}" type="datetimeFigureOut">
               <a:rPr lang="en-US" smtClean="0"/>
-              <a:t>4/26/2021</a:t>
+              <a:t>5/21/2021</a:t>
             </a:fld>
             <a:endParaRPr lang="en-US"/>
           </a:p>
@@ -2190,7 +2190,7 @@
           <a:p>
             <a:fld id="{969106CC-F607-DD49-B981-653BDF28D768}" type="datetimeFigureOut">
               <a:rPr lang="en-US" smtClean="0"/>
-              <a:t>4/26/2021</a:t>
+              <a:t>5/21/2021</a:t>
             </a:fld>
             <a:endParaRPr lang="en-US"/>
           </a:p>
@@ -2303,7 +2303,7 @@
           <a:p>
             <a:fld id="{969106CC-F607-DD49-B981-653BDF28D768}" type="datetimeFigureOut">
               <a:rPr lang="en-US" smtClean="0"/>
-              <a:t>4/26/2021</a:t>
+              <a:t>5/21/2021</a:t>
             </a:fld>
             <a:endParaRPr lang="en-US"/>
           </a:p>
@@ -2618,7 +2618,7 @@
           <a:p>
             <a:fld id="{969106CC-F607-DD49-B981-653BDF28D768}" type="datetimeFigureOut">
               <a:rPr lang="en-US" smtClean="0"/>
-              <a:t>4/26/2021</a:t>
+              <a:t>5/21/2021</a:t>
             </a:fld>
             <a:endParaRPr lang="en-US"/>
           </a:p>
@@ -2834,7 +2834,7 @@
         </p:nvSpPr>
         <p:spPr>
           <a:xfrm>
-            <a:off x="7165464" y="251582"/>
+            <a:off x="7165464" y="1024671"/>
             <a:ext cx="4805330" cy="2228295"/>
           </a:xfrm>
         </p:spPr>
@@ -2910,7 +2910,7 @@
           <a:p>
             <a:fld id="{969106CC-F607-DD49-B981-653BDF28D768}" type="datetimeFigureOut">
               <a:rPr lang="en-US" smtClean="0"/>
-              <a:t>4/27/2021</a:t>
+              <a:t>5/21/2021</a:t>
             </a:fld>
             <a:endParaRPr lang="en-US"/>
           </a:p>

</xml_diff>

<commit_message>
made functions for each plot and updated text and point sizes
</commit_message>
<xml_diff>
--- a/bd_template_homemade.pptx
+++ b/bd_template_homemade.pptx
@@ -209,7 +209,7 @@
           <a:p>
             <a:fld id="{42712DD4-FBD6-4D50-8BFA-3BD02E614182}" type="datetimeFigureOut">
               <a:rPr lang="en-US" smtClean="0"/>
-              <a:t>5/21/2021</a:t>
+              <a:t>6/4/2021</a:t>
             </a:fld>
             <a:endParaRPr lang="en-US"/>
           </a:p>
@@ -645,7 +645,7 @@
           <a:p>
             <a:fld id="{969106CC-F607-DD49-B981-653BDF28D768}" type="datetimeFigureOut">
               <a:rPr lang="en-US" smtClean="0"/>
-              <a:t>5/21/2021</a:t>
+              <a:t>6/4/2021</a:t>
             </a:fld>
             <a:endParaRPr lang="en-US"/>
           </a:p>
@@ -853,7 +853,7 @@
           <a:p>
             <a:fld id="{969106CC-F607-DD49-B981-653BDF28D768}" type="datetimeFigureOut">
               <a:rPr lang="en-US" smtClean="0"/>
-              <a:t>5/21/2021</a:t>
+              <a:t>6/4/2021</a:t>
             </a:fld>
             <a:endParaRPr lang="en-US"/>
           </a:p>
@@ -1621,7 +1621,7 @@
           <a:p>
             <a:fld id="{969106CC-F607-DD49-B981-653BDF28D768}" type="datetimeFigureOut">
               <a:rPr lang="en-US" smtClean="0"/>
-              <a:t>5/21/2021</a:t>
+              <a:t>6/4/2021</a:t>
             </a:fld>
             <a:endParaRPr lang="en-US"/>
           </a:p>
@@ -2041,7 +2041,7 @@
           <a:p>
             <a:fld id="{969106CC-F607-DD49-B981-653BDF28D768}" type="datetimeFigureOut">
               <a:rPr lang="en-US" smtClean="0"/>
-              <a:t>5/21/2021</a:t>
+              <a:t>6/4/2021</a:t>
             </a:fld>
             <a:endParaRPr lang="en-US"/>
           </a:p>
@@ -2190,7 +2190,7 @@
           <a:p>
             <a:fld id="{969106CC-F607-DD49-B981-653BDF28D768}" type="datetimeFigureOut">
               <a:rPr lang="en-US" smtClean="0"/>
-              <a:t>5/21/2021</a:t>
+              <a:t>6/4/2021</a:t>
             </a:fld>
             <a:endParaRPr lang="en-US"/>
           </a:p>
@@ -2303,7 +2303,7 @@
           <a:p>
             <a:fld id="{969106CC-F607-DD49-B981-653BDF28D768}" type="datetimeFigureOut">
               <a:rPr lang="en-US" smtClean="0"/>
-              <a:t>5/21/2021</a:t>
+              <a:t>6/4/2021</a:t>
             </a:fld>
             <a:endParaRPr lang="en-US"/>
           </a:p>
@@ -2618,7 +2618,7 @@
           <a:p>
             <a:fld id="{969106CC-F607-DD49-B981-653BDF28D768}" type="datetimeFigureOut">
               <a:rPr lang="en-US" smtClean="0"/>
-              <a:t>5/21/2021</a:t>
+              <a:t>6/4/2021</a:t>
             </a:fld>
             <a:endParaRPr lang="en-US"/>
           </a:p>
@@ -2767,8 +2767,8 @@
         </p:nvSpPr>
         <p:spPr>
           <a:xfrm>
-            <a:off x="243682" y="1262909"/>
-            <a:ext cx="6316916" cy="4873625"/>
+            <a:off x="243681" y="1262909"/>
+            <a:ext cx="6644795" cy="4873625"/>
           </a:xfrm>
         </p:spPr>
         <p:txBody>
@@ -2910,7 +2910,7 @@
           <a:p>
             <a:fld id="{969106CC-F607-DD49-B981-653BDF28D768}" type="datetimeFigureOut">
               <a:rPr lang="en-US" smtClean="0"/>
-              <a:t>5/21/2021</a:t>
+              <a:t>6/4/2021</a:t>
             </a:fld>
             <a:endParaRPr lang="en-US"/>
           </a:p>

</xml_diff>